<commit_message>
Added scratch slide to UI design
</commit_message>
<xml_diff>
--- a/You Eye.pptx
+++ b/You Eye.pptx
@@ -5,15 +5,16 @@
     <p:sldMasterId id="2147483648" r:id="rId1"/>
   </p:sldMasterIdLst>
   <p:notesMasterIdLst>
-    <p:notesMasterId r:id="rId5"/>
+    <p:notesMasterId r:id="rId6"/>
   </p:notesMasterIdLst>
   <p:sldIdLst>
     <p:sldId id="256" r:id="rId2"/>
-    <p:sldId id="257" r:id="rId3"/>
-    <p:sldId id="258" r:id="rId4"/>
+    <p:sldId id="259" r:id="rId3"/>
+    <p:sldId id="257" r:id="rId4"/>
+    <p:sldId id="258" r:id="rId5"/>
   </p:sldIdLst>
   <p:sldSz cx="12192000" cy="6858000"/>
-  <p:notesSz cx="6858000" cy="9144000"/>
+  <p:notesSz cx="6797675" cy="9926638"/>
   <p:defaultTextStyle>
     <a:defPPr>
       <a:defRPr lang="en-US"/>
@@ -152,7 +153,7 @@
         <p:spPr>
           <a:xfrm>
             <a:off x="0" y="0"/>
-            <a:ext cx="2971800" cy="458788"/>
+            <a:ext cx="2945659" cy="498056"/>
           </a:xfrm>
           <a:prstGeom prst="rect">
             <a:avLst/>
@@ -182,8 +183,8 @@
         </p:nvSpPr>
         <p:spPr>
           <a:xfrm>
-            <a:off x="3884613" y="0"/>
-            <a:ext cx="2971800" cy="458788"/>
+            <a:off x="3850443" y="0"/>
+            <a:ext cx="2945659" cy="498056"/>
           </a:xfrm>
           <a:prstGeom prst="rect">
             <a:avLst/>
@@ -199,7 +200,7 @@
           <a:p>
             <a:fld id="{83F32FBB-7648-4809-90F5-9C5D89B11AF5}" type="datetimeFigureOut">
               <a:rPr lang="en-AU" smtClean="0"/>
-              <a:t>16/10/2020</a:t>
+              <a:t>17/10/2020</a:t>
             </a:fld>
             <a:endParaRPr lang="en-AU"/>
           </a:p>
@@ -217,8 +218,8 @@
         </p:nvSpPr>
         <p:spPr>
           <a:xfrm>
-            <a:off x="685800" y="1143000"/>
-            <a:ext cx="5486400" cy="3086100"/>
+            <a:off x="422275" y="1241425"/>
+            <a:ext cx="5953125" cy="3349625"/>
           </a:xfrm>
           <a:prstGeom prst="rect">
             <a:avLst/>
@@ -250,8 +251,8 @@
         </p:nvSpPr>
         <p:spPr>
           <a:xfrm>
-            <a:off x="685800" y="4400550"/>
-            <a:ext cx="5486400" cy="3600450"/>
+            <a:off x="679768" y="4777194"/>
+            <a:ext cx="5438140" cy="3908614"/>
           </a:xfrm>
           <a:prstGeom prst="rect">
             <a:avLst/>
@@ -310,8 +311,8 @@
         </p:nvSpPr>
         <p:spPr>
           <a:xfrm>
-            <a:off x="0" y="8685213"/>
-            <a:ext cx="2971800" cy="458787"/>
+            <a:off x="0" y="9428584"/>
+            <a:ext cx="2945659" cy="498055"/>
           </a:xfrm>
           <a:prstGeom prst="rect">
             <a:avLst/>
@@ -341,8 +342,8 @@
         </p:nvSpPr>
         <p:spPr>
           <a:xfrm>
-            <a:off x="3884613" y="8685213"/>
-            <a:ext cx="2971800" cy="458787"/>
+            <a:off x="3850443" y="9428584"/>
+            <a:ext cx="2945659" cy="498055"/>
           </a:xfrm>
           <a:prstGeom prst="rect">
             <a:avLst/>
@@ -616,7 +617,7 @@
           <a:p>
             <a:fld id="{79961023-88BF-4819-B666-00DEFD1CC653}" type="datetimeFigureOut">
               <a:rPr lang="en-AU" smtClean="0"/>
-              <a:t>16/10/2020</a:t>
+              <a:t>17/10/2020</a:t>
             </a:fld>
             <a:endParaRPr lang="en-AU"/>
           </a:p>
@@ -816,7 +817,7 @@
           <a:p>
             <a:fld id="{79961023-88BF-4819-B666-00DEFD1CC653}" type="datetimeFigureOut">
               <a:rPr lang="en-AU" smtClean="0"/>
-              <a:t>16/10/2020</a:t>
+              <a:t>17/10/2020</a:t>
             </a:fld>
             <a:endParaRPr lang="en-AU"/>
           </a:p>
@@ -1026,7 +1027,7 @@
           <a:p>
             <a:fld id="{79961023-88BF-4819-B666-00DEFD1CC653}" type="datetimeFigureOut">
               <a:rPr lang="en-AU" smtClean="0"/>
-              <a:t>16/10/2020</a:t>
+              <a:t>17/10/2020</a:t>
             </a:fld>
             <a:endParaRPr lang="en-AU"/>
           </a:p>
@@ -1226,7 +1227,7 @@
           <a:p>
             <a:fld id="{79961023-88BF-4819-B666-00DEFD1CC653}" type="datetimeFigureOut">
               <a:rPr lang="en-AU" smtClean="0"/>
-              <a:t>16/10/2020</a:t>
+              <a:t>17/10/2020</a:t>
             </a:fld>
             <a:endParaRPr lang="en-AU"/>
           </a:p>
@@ -1502,7 +1503,7 @@
           <a:p>
             <a:fld id="{79961023-88BF-4819-B666-00DEFD1CC653}" type="datetimeFigureOut">
               <a:rPr lang="en-AU" smtClean="0"/>
-              <a:t>16/10/2020</a:t>
+              <a:t>17/10/2020</a:t>
             </a:fld>
             <a:endParaRPr lang="en-AU"/>
           </a:p>
@@ -1770,7 +1771,7 @@
           <a:p>
             <a:fld id="{79961023-88BF-4819-B666-00DEFD1CC653}" type="datetimeFigureOut">
               <a:rPr lang="en-AU" smtClean="0"/>
-              <a:t>16/10/2020</a:t>
+              <a:t>17/10/2020</a:t>
             </a:fld>
             <a:endParaRPr lang="en-AU"/>
           </a:p>
@@ -2185,7 +2186,7 @@
           <a:p>
             <a:fld id="{79961023-88BF-4819-B666-00DEFD1CC653}" type="datetimeFigureOut">
               <a:rPr lang="en-AU" smtClean="0"/>
-              <a:t>16/10/2020</a:t>
+              <a:t>17/10/2020</a:t>
             </a:fld>
             <a:endParaRPr lang="en-AU"/>
           </a:p>
@@ -2327,7 +2328,7 @@
           <a:p>
             <a:fld id="{79961023-88BF-4819-B666-00DEFD1CC653}" type="datetimeFigureOut">
               <a:rPr lang="en-AU" smtClean="0"/>
-              <a:t>16/10/2020</a:t>
+              <a:t>17/10/2020</a:t>
             </a:fld>
             <a:endParaRPr lang="en-AU"/>
           </a:p>
@@ -2440,7 +2441,7 @@
           <a:p>
             <a:fld id="{79961023-88BF-4819-B666-00DEFD1CC653}" type="datetimeFigureOut">
               <a:rPr lang="en-AU" smtClean="0"/>
-              <a:t>16/10/2020</a:t>
+              <a:t>17/10/2020</a:t>
             </a:fld>
             <a:endParaRPr lang="en-AU"/>
           </a:p>
@@ -2753,7 +2754,7 @@
           <a:p>
             <a:fld id="{79961023-88BF-4819-B666-00DEFD1CC653}" type="datetimeFigureOut">
               <a:rPr lang="en-AU" smtClean="0"/>
-              <a:t>16/10/2020</a:t>
+              <a:t>17/10/2020</a:t>
             </a:fld>
             <a:endParaRPr lang="en-AU"/>
           </a:p>
@@ -3042,7 +3043,7 @@
           <a:p>
             <a:fld id="{79961023-88BF-4819-B666-00DEFD1CC653}" type="datetimeFigureOut">
               <a:rPr lang="en-AU" smtClean="0"/>
-              <a:t>16/10/2020</a:t>
+              <a:t>17/10/2020</a:t>
             </a:fld>
             <a:endParaRPr lang="en-AU"/>
           </a:p>
@@ -3285,7 +3286,7 @@
           <a:p>
             <a:fld id="{79961023-88BF-4819-B666-00DEFD1CC653}" type="datetimeFigureOut">
               <a:rPr lang="en-AU" smtClean="0"/>
-              <a:t>16/10/2020</a:t>
+              <a:t>17/10/2020</a:t>
             </a:fld>
             <a:endParaRPr lang="en-AU"/>
           </a:p>
@@ -4479,6 +4480,66 @@
           <a:chExt cx="0" cy="0"/>
         </a:xfrm>
       </p:grpSpPr>
+      <p:pic>
+        <p:nvPicPr>
+          <p:cNvPr id="4" name="Picture 3">
+            <a:extLst>
+              <a:ext uri="{FF2B5EF4-FFF2-40B4-BE49-F238E27FC236}">
+                <a16:creationId xmlns:a16="http://schemas.microsoft.com/office/drawing/2014/main" id="{62F9D3E0-E471-40FC-8092-26566E047FD3}"/>
+              </a:ext>
+            </a:extLst>
+          </p:cNvPr>
+          <p:cNvPicPr>
+            <a:picLocks noChangeAspect="1"/>
+          </p:cNvPicPr>
+          <p:nvPr/>
+        </p:nvPicPr>
+        <p:blipFill>
+          <a:blip r:embed="rId2"/>
+          <a:stretch>
+            <a:fillRect/>
+          </a:stretch>
+        </p:blipFill>
+        <p:spPr>
+          <a:xfrm>
+            <a:off x="3260051" y="0"/>
+            <a:ext cx="5671897" cy="6858000"/>
+          </a:xfrm>
+          <a:prstGeom prst="rect">
+            <a:avLst/>
+          </a:prstGeom>
+        </p:spPr>
+      </p:pic>
+    </p:spTree>
+    <p:extLst>
+      <p:ext uri="{BB962C8B-B14F-4D97-AF65-F5344CB8AC3E}">
+        <p14:creationId xmlns:p14="http://schemas.microsoft.com/office/powerpoint/2010/main" val="3527175167"/>
+      </p:ext>
+    </p:extLst>
+  </p:cSld>
+  <p:clrMapOvr>
+    <a:masterClrMapping/>
+  </p:clrMapOvr>
+</p:sld>
+</file>
+
+<file path=ppt/slides/slide3.xml><?xml version="1.0" encoding="utf-8"?>
+<p:sld xmlns:a="http://schemas.openxmlformats.org/drawingml/2006/main" xmlns:r="http://schemas.openxmlformats.org/officeDocument/2006/relationships" xmlns:p="http://schemas.openxmlformats.org/presentationml/2006/main">
+  <p:cSld>
+    <p:spTree>
+      <p:nvGrpSpPr>
+        <p:cNvPr id="1" name=""/>
+        <p:cNvGrpSpPr/>
+        <p:nvPr/>
+      </p:nvGrpSpPr>
+      <p:grpSpPr>
+        <a:xfrm>
+          <a:off x="0" y="0"/>
+          <a:ext cx="0" cy="0"/>
+          <a:chOff x="0" y="0"/>
+          <a:chExt cx="0" cy="0"/>
+        </a:xfrm>
+      </p:grpSpPr>
       <p:sp>
         <p:nvSpPr>
           <p:cNvPr id="2" name="Title 1">
@@ -4546,7 +4607,7 @@
 </p:sld>
 </file>
 
-<file path=ppt/slides/slide3.xml><?xml version="1.0" encoding="utf-8"?>
+<file path=ppt/slides/slide4.xml><?xml version="1.0" encoding="utf-8"?>
 <p:sld xmlns:a="http://schemas.openxmlformats.org/drawingml/2006/main" xmlns:r="http://schemas.openxmlformats.org/officeDocument/2006/relationships" xmlns:p="http://schemas.openxmlformats.org/presentationml/2006/main">
   <p:cSld>
     <p:spTree>

</xml_diff>